<commit_message>
Updates the introduction agenda
This is now inline with the modules being created.
</commit_message>
<xml_diff>
--- a/01-introduction.pptx
+++ b/01-introduction.pptx
@@ -285,7 +285,7 @@
               <a:pPr>
                 <a:defRPr/>
               </a:pPr>
-              <a:t>3/8/16</a:t>
+              <a:t>10/7/16</a:t>
             </a:fld>
             <a:endParaRPr lang="en-US" dirty="0"/>
           </a:p>
@@ -468,7 +468,7 @@
               <a:pPr>
                 <a:defRPr/>
               </a:pPr>
-              <a:t>3/8/16</a:t>
+              <a:t>10/7/16</a:t>
             </a:fld>
             <a:endParaRPr lang="en-US" dirty="0"/>
           </a:p>
@@ -1651,23 +1651,7 @@
             </a:r>
             <a:r>
               <a:rPr lang="en-US" dirty="0" smtClean="0"/>
-              <a:t>thought </a:t>
-            </a:r>
-            <a:r>
-              <a:rPr lang="en-US" dirty="0" smtClean="0"/>
-              <a:t>process </a:t>
-            </a:r>
-            <a:r>
-              <a:rPr lang="en-US" dirty="0" smtClean="0"/>
-              <a:t>on why </a:t>
-            </a:r>
-            <a:r>
-              <a:rPr lang="en-US" dirty="0" smtClean="0"/>
-              <a:t>and how to best employ </a:t>
-            </a:r>
-            <a:r>
-              <a:rPr lang="en-US" dirty="0" smtClean="0"/>
-              <a:t>these techniques. </a:t>
+              <a:t>thought process on why and how to best employ these techniques. </a:t>
             </a:r>
           </a:p>
           <a:p>
@@ -1680,15 +1664,7 @@
             </a:r>
             <a:r>
               <a:rPr lang="en-US" dirty="0" smtClean="0"/>
-              <a:t>During </a:t>
-            </a:r>
-            <a:r>
-              <a:rPr lang="en-US" dirty="0" smtClean="0"/>
-              <a:t>and throughout the content we will have discussion where we may have additional time to talk about many different topics but in this interest of time and popular opinion we may need to leave those discussions</a:t>
-            </a:r>
-            <a:r>
-              <a:rPr lang="en-US" dirty="0" smtClean="0"/>
-              <a:t>.</a:t>
+              <a:t>During and throughout the content we will have discussion where we may have additional time to talk about many different topics but in this interest of time and popular opinion we may need to leave those discussions.</a:t>
             </a:r>
           </a:p>
           <a:p>
@@ -11064,21 +11040,8 @@
             </a:r>
             <a:r>
               <a:rPr lang="en-US" sz="3600" dirty="0" smtClean="0"/>
-              <a:t>with the ability to extend the </a:t>
-            </a:r>
-            <a:r>
-              <a:rPr lang="en-US" sz="3600" dirty="0" smtClean="0"/>
-              <a:t>components </a:t>
-            </a:r>
-            <a:r>
-              <a:rPr lang="en-US" sz="3600" dirty="0" smtClean="0"/>
-              <a:t>of </a:t>
-            </a:r>
-            <a:r>
-              <a:rPr lang="en-US" sz="3600" dirty="0" smtClean="0"/>
-              <a:t>Cookbooks.</a:t>
-            </a:r>
-            <a:endParaRPr lang="en-US" sz="3600" dirty="0" smtClean="0"/>
+              <a:t>with the ability to extend the components of Cookbooks.</a:t>
+            </a:r>
           </a:p>
           <a:p>
             <a:pPr marL="0" lvl="1"/>
@@ -11409,14 +11372,27 @@
           <a:p>
             <a:r>
               <a:rPr lang="en-US" dirty="0" smtClean="0"/>
-              <a:t>Custom Resources</a:t>
-            </a:r>
+              <a:t>Approaches to Extending Resources</a:t>
+            </a:r>
+          </a:p>
+          <a:p>
+            <a:r>
+              <a:rPr lang="en-US" dirty="0" smtClean="0"/>
+              <a:t>Why Use Custom Resources</a:t>
+            </a:r>
+            <a:endParaRPr lang="en-US" dirty="0" smtClean="0"/>
           </a:p>
           <a:p>
             <a:r>
               <a:rPr lang="en-US" dirty="0" smtClean="0"/>
               <a:t>Creating a Custom Resource</a:t>
             </a:r>
+          </a:p>
+          <a:p>
+            <a:r>
+              <a:rPr lang="en-US" dirty="0" smtClean="0"/>
+              <a:t>Refining a Custom Resource</a:t>
+            </a:r>
             <a:endParaRPr lang="en-US" dirty="0" smtClean="0"/>
           </a:p>
           <a:p>
@@ -11443,9 +11419,20 @@
               <a:rPr lang="en-US" dirty="0" err="1" smtClean="0"/>
               <a:t>Ohai</a:t>
             </a:r>
+            <a:endParaRPr lang="en-US" dirty="0" smtClean="0"/>
+          </a:p>
+          <a:p>
+            <a:r>
+              <a:rPr lang="en-US" dirty="0" err="1" smtClean="0"/>
+              <a:t>Ohai</a:t>
+            </a:r>
             <a:r>
               <a:rPr lang="en-US" dirty="0" smtClean="0"/>
-              <a:t> Plugins</a:t>
+              <a:t> </a:t>
+            </a:r>
+            <a:r>
+              <a:rPr lang="en-US" dirty="0" smtClean="0"/>
+              <a:t>Plugins</a:t>
             </a:r>
           </a:p>
           <a:p>
@@ -11459,8 +11446,23 @@
             </a:r>
             <a:r>
               <a:rPr lang="en-US" dirty="0" smtClean="0"/>
-              <a:t> Plugin</a:t>
-            </a:r>
+              <a:t> </a:t>
+            </a:r>
+            <a:r>
+              <a:rPr lang="en-US" dirty="0" smtClean="0"/>
+              <a:t>Plugin</a:t>
+            </a:r>
+          </a:p>
+          <a:p>
+            <a:r>
+              <a:rPr lang="en-US" dirty="0" smtClean="0"/>
+              <a:t>Tuning </a:t>
+            </a:r>
+            <a:r>
+              <a:rPr lang="en-US" dirty="0" err="1" smtClean="0"/>
+              <a:t>Ohai</a:t>
+            </a:r>
+            <a:endParaRPr lang="en-US" dirty="0" smtClean="0"/>
           </a:p>
         </p:txBody>
       </p:sp>

</xml_diff>

<commit_message>
Updates for quality and printing
</commit_message>
<xml_diff>
--- a/01-introduction.pptx
+++ b/01-introduction.pptx
@@ -154,7 +154,7 @@
   </p:defaultTextStyle>
   <p:extLst>
     <p:ext uri="{EFAFB233-063F-42B5-8137-9DF3F51BA10A}">
-      <p15:sldGuideLst xmlns:p15="http://schemas.microsoft.com/office/powerpoint/2012/main" xmlns="">
+      <p15:sldGuideLst xmlns:p15="http://schemas.microsoft.com/office/powerpoint/2012/main">
         <p15:guide id="1" orient="horz" pos="894">
           <p15:clr>
             <a:srgbClr val="A4A3A4"/>
@@ -168,7 +168,7 @@
       </p15:sldGuideLst>
     </p:ext>
     <p:ext uri="{2D200454-40CA-4A62-9FC3-DE9A4176ACB9}">
-      <p15:notesGuideLst xmlns:p15="http://schemas.microsoft.com/office/powerpoint/2012/main" xmlns=""/>
+      <p15:notesGuideLst xmlns:p15="http://schemas.microsoft.com/office/powerpoint/2012/main"/>
     </p:ext>
   </p:extLst>
 </p:presentation>
@@ -285,7 +285,7 @@
               <a:pPr>
                 <a:defRPr/>
               </a:pPr>
-              <a:t>10/7/16</a:t>
+              <a:t>2016-10-22</a:t>
             </a:fld>
             <a:endParaRPr lang="en-US" dirty="0"/>
           </a:p>
@@ -468,7 +468,7 @@
               <a:pPr>
                 <a:defRPr/>
               </a:pPr>
-              <a:t>10/7/16</a:t>
+              <a:t>2016-10-22</a:t>
             </a:fld>
             <a:endParaRPr lang="en-US" dirty="0"/>
           </a:p>
@@ -919,7 +919,11 @@
             </a:r>
             <a:r>
               <a:rPr lang="en-US" baseline="0" dirty="0" smtClean="0"/>
-              <a:t> Chef.</a:t>
+              <a:t> </a:t>
+            </a:r>
+            <a:r>
+              <a:rPr lang="en-US" baseline="0" dirty="0" smtClean="0"/>
+              <a:t>Cookbooks.</a:t>
             </a:r>
             <a:endParaRPr lang="en-US" dirty="0"/>
           </a:p>
@@ -2871,13 +2875,13 @@
   <p:clrMapOvr>
     <a:masterClrMapping/>
   </p:clrMapOvr>
-  <p:transition xmlns:p14="http://schemas.microsoft.com/office/powerpoint/2010/main" spd="med">
+  <p:transition spd="med">
     <p:fade/>
   </p:transition>
   <p:timing>
     <p:tnLst>
       <p:par>
-        <p:cTn xmlns:p14="http://schemas.microsoft.com/office/powerpoint/2010/main" id="1" dur="indefinite" restart="never" nodeType="tmRoot"/>
+        <p:cTn id="1" dur="indefinite" restart="never" nodeType="tmRoot"/>
       </p:par>
     </p:tnLst>
   </p:timing>
@@ -3173,13 +3177,13 @@
   <p:clrMapOvr>
     <a:overrideClrMapping bg1="lt1" tx1="dk1" bg2="lt2" tx2="dk2" accent1="accent1" accent2="accent2" accent3="accent3" accent4="accent4" accent5="accent5" accent6="accent6" hlink="hlink" folHlink="folHlink"/>
   </p:clrMapOvr>
-  <p:transition xmlns:p14="http://schemas.microsoft.com/office/powerpoint/2010/main" spd="med">
+  <p:transition spd="med">
     <p:fade/>
   </p:transition>
   <p:timing>
     <p:tnLst>
       <p:par>
-        <p:cTn xmlns:p14="http://schemas.microsoft.com/office/powerpoint/2010/main" id="1" dur="indefinite" restart="never" nodeType="tmRoot"/>
+        <p:cTn id="1" dur="indefinite" restart="never" nodeType="tmRoot"/>
       </p:par>
     </p:tnLst>
   </p:timing>
@@ -3313,14 +3317,14 @@
           </a:ln>
           <a:extLst>
             <a:ext uri="{909E8E84-426E-40dd-AFC4-6F175D3DCCD1}">
-              <a14:hiddenFill xmlns:a14="http://schemas.microsoft.com/office/drawing/2010/main">
+              <a14:hiddenFill xmlns:a14="http://schemas.microsoft.com/office/drawing/2010/main" xmlns="">
                 <a:solidFill>
                   <a:srgbClr val="FFFFFF"/>
                 </a:solidFill>
               </a14:hiddenFill>
             </a:ext>
             <a:ext uri="{91240B29-F687-4f45-9708-019B960494DF}">
-              <a14:hiddenLine xmlns:a14="http://schemas.microsoft.com/office/drawing/2010/main" w="9525">
+              <a14:hiddenLine xmlns:a14="http://schemas.microsoft.com/office/drawing/2010/main" xmlns="" w="9525">
                 <a:solidFill>
                   <a:srgbClr val="000000"/>
                 </a:solidFill>
@@ -3468,14 +3472,14 @@
           </a:ln>
           <a:extLst>
             <a:ext uri="{909E8E84-426E-40dd-AFC4-6F175D3DCCD1}">
-              <a14:hiddenFill xmlns:a14="http://schemas.microsoft.com/office/drawing/2010/main">
+              <a14:hiddenFill xmlns:a14="http://schemas.microsoft.com/office/drawing/2010/main" xmlns="">
                 <a:solidFill>
                   <a:srgbClr val="FFFFFF"/>
                 </a:solidFill>
               </a14:hiddenFill>
             </a:ext>
             <a:ext uri="{91240B29-F687-4f45-9708-019B960494DF}">
-              <a14:hiddenLine xmlns:a14="http://schemas.microsoft.com/office/drawing/2010/main" w="9525">
+              <a14:hiddenLine xmlns:a14="http://schemas.microsoft.com/office/drawing/2010/main" xmlns="" w="9525">
                 <a:solidFill>
                   <a:srgbClr val="000000"/>
                 </a:solidFill>
@@ -3873,13 +3877,13 @@
   <p:clrMapOvr>
     <a:overrideClrMapping bg1="lt1" tx1="dk1" bg2="lt2" tx2="dk2" accent1="accent1" accent2="accent2" accent3="accent3" accent4="accent4" accent5="accent5" accent6="accent6" hlink="hlink" folHlink="folHlink"/>
   </p:clrMapOvr>
-  <p:transition xmlns:p14="http://schemas.microsoft.com/office/powerpoint/2010/main" spd="med">
+  <p:transition spd="med">
     <p:fade/>
   </p:transition>
   <p:timing>
     <p:tnLst>
       <p:par>
-        <p:cTn xmlns:p14="http://schemas.microsoft.com/office/powerpoint/2010/main" id="1" dur="indefinite" restart="never" nodeType="tmRoot"/>
+        <p:cTn id="1" dur="indefinite" restart="never" nodeType="tmRoot"/>
       </p:par>
     </p:tnLst>
   </p:timing>
@@ -3973,14 +3977,14 @@
           </a:ln>
           <a:extLst>
             <a:ext uri="{909E8E84-426E-40dd-AFC4-6F175D3DCCD1}">
-              <a14:hiddenFill xmlns:a14="http://schemas.microsoft.com/office/drawing/2010/main">
+              <a14:hiddenFill xmlns:a14="http://schemas.microsoft.com/office/drawing/2010/main" xmlns="">
                 <a:solidFill>
                   <a:srgbClr val="FFFFFF"/>
                 </a:solidFill>
               </a14:hiddenFill>
             </a:ext>
             <a:ext uri="{91240B29-F687-4f45-9708-019B960494DF}">
-              <a14:hiddenLine xmlns:a14="http://schemas.microsoft.com/office/drawing/2010/main" w="9525">
+              <a14:hiddenLine xmlns:a14="http://schemas.microsoft.com/office/drawing/2010/main" xmlns="" w="9525">
                 <a:solidFill>
                   <a:srgbClr val="000000"/>
                 </a:solidFill>
@@ -4002,13 +4006,13 @@
   <p:clrMapOvr>
     <a:masterClrMapping/>
   </p:clrMapOvr>
-  <p:transition xmlns:p14="http://schemas.microsoft.com/office/powerpoint/2010/main" spd="med">
+  <p:transition spd="med">
     <p:fade/>
   </p:transition>
   <p:timing>
     <p:tnLst>
       <p:par>
-        <p:cTn xmlns:p14="http://schemas.microsoft.com/office/powerpoint/2010/main" id="1" dur="indefinite" restart="never" nodeType="tmRoot"/>
+        <p:cTn id="1" dur="indefinite" restart="never" nodeType="tmRoot"/>
       </p:par>
     </p:tnLst>
   </p:timing>
@@ -4296,13 +4300,13 @@
   <p:clrMapOvr>
     <a:masterClrMapping/>
   </p:clrMapOvr>
-  <p:transition xmlns:p14="http://schemas.microsoft.com/office/powerpoint/2010/main" spd="med">
+  <p:transition spd="med">
     <p:fade/>
   </p:transition>
   <p:timing>
     <p:tnLst>
       <p:par>
-        <p:cTn xmlns:p14="http://schemas.microsoft.com/office/powerpoint/2010/main" id="1" dur="indefinite" restart="never" nodeType="tmRoot"/>
+        <p:cTn id="1" dur="indefinite" restart="never" nodeType="tmRoot"/>
       </p:par>
     </p:tnLst>
   </p:timing>
@@ -4590,13 +4594,13 @@
   <p:clrMapOvr>
     <a:masterClrMapping/>
   </p:clrMapOvr>
-  <p:transition xmlns:p14="http://schemas.microsoft.com/office/powerpoint/2010/main" spd="med">
+  <p:transition spd="med">
     <p:fade/>
   </p:transition>
   <p:timing>
     <p:tnLst>
       <p:par>
-        <p:cTn xmlns:p14="http://schemas.microsoft.com/office/powerpoint/2010/main" id="1" dur="indefinite" restart="never" nodeType="tmRoot"/>
+        <p:cTn id="1" dur="indefinite" restart="never" nodeType="tmRoot"/>
       </p:par>
     </p:tnLst>
   </p:timing>
@@ -4946,13 +4950,13 @@
   <p:clrMapOvr>
     <a:masterClrMapping/>
   </p:clrMapOvr>
-  <p:transition xmlns:p14="http://schemas.microsoft.com/office/powerpoint/2010/main" spd="med">
+  <p:transition spd="med">
     <p:fade/>
   </p:transition>
   <p:timing>
     <p:tnLst>
       <p:par>
-        <p:cTn xmlns:p14="http://schemas.microsoft.com/office/powerpoint/2010/main" id="1" dur="indefinite" restart="never" nodeType="tmRoot"/>
+        <p:cTn id="1" dur="indefinite" restart="never" nodeType="tmRoot"/>
       </p:par>
     </p:tnLst>
   </p:timing>
@@ -5240,13 +5244,13 @@
   <p:clrMapOvr>
     <a:masterClrMapping/>
   </p:clrMapOvr>
-  <p:transition xmlns:p14="http://schemas.microsoft.com/office/powerpoint/2010/main" spd="med">
+  <p:transition spd="med">
     <p:fade/>
   </p:transition>
   <p:timing>
     <p:tnLst>
       <p:par>
-        <p:cTn xmlns:p14="http://schemas.microsoft.com/office/powerpoint/2010/main" id="1" dur="indefinite" restart="never" nodeType="tmRoot"/>
+        <p:cTn id="1" dur="indefinite" restart="never" nodeType="tmRoot"/>
       </p:par>
     </p:tnLst>
   </p:timing>
@@ -5464,14 +5468,14 @@
           </a:ln>
           <a:extLst>
             <a:ext uri="{909E8E84-426E-40dd-AFC4-6F175D3DCCD1}">
-              <a14:hiddenFill xmlns:a14="http://schemas.microsoft.com/office/drawing/2010/main">
+              <a14:hiddenFill xmlns:a14="http://schemas.microsoft.com/office/drawing/2010/main" xmlns="">
                 <a:solidFill>
                   <a:srgbClr val="FFFFFF"/>
                 </a:solidFill>
               </a14:hiddenFill>
             </a:ext>
             <a:ext uri="{91240B29-F687-4f45-9708-019B960494DF}">
-              <a14:hiddenLine xmlns:a14="http://schemas.microsoft.com/office/drawing/2010/main" w="9525">
+              <a14:hiddenLine xmlns:a14="http://schemas.microsoft.com/office/drawing/2010/main" xmlns="" w="9525">
                 <a:solidFill>
                   <a:srgbClr val="000000"/>
                 </a:solidFill>
@@ -5668,13 +5672,13 @@
   <p:clrMapOvr>
     <a:masterClrMapping/>
   </p:clrMapOvr>
-  <p:transition xmlns:p14="http://schemas.microsoft.com/office/powerpoint/2010/main" spd="med">
+  <p:transition spd="med">
     <p:fade/>
   </p:transition>
   <p:timing>
     <p:tnLst>
       <p:par>
-        <p:cTn xmlns:p14="http://schemas.microsoft.com/office/powerpoint/2010/main" id="1" dur="indefinite" restart="never" nodeType="tmRoot"/>
+        <p:cTn id="1" dur="indefinite" restart="never" nodeType="tmRoot"/>
       </p:par>
     </p:tnLst>
   </p:timing>
@@ -5993,13 +5997,13 @@
   <p:clrMapOvr>
     <a:masterClrMapping/>
   </p:clrMapOvr>
-  <p:transition xmlns:p14="http://schemas.microsoft.com/office/powerpoint/2010/main" spd="med">
+  <p:transition spd="med">
     <p:fade/>
   </p:transition>
   <p:timing>
     <p:tnLst>
       <p:par>
-        <p:cTn xmlns:p14="http://schemas.microsoft.com/office/powerpoint/2010/main" id="1" dur="indefinite" restart="never" nodeType="tmRoot"/>
+        <p:cTn id="1" dur="indefinite" restart="never" nodeType="tmRoot"/>
       </p:par>
     </p:tnLst>
   </p:timing>
@@ -6312,13 +6316,13 @@
   <p:clrMapOvr>
     <a:masterClrMapping/>
   </p:clrMapOvr>
-  <p:transition xmlns:p14="http://schemas.microsoft.com/office/powerpoint/2010/main" spd="med">
+  <p:transition spd="med">
     <p:fade/>
   </p:transition>
   <p:timing>
     <p:tnLst>
       <p:par>
-        <p:cTn xmlns:p14="http://schemas.microsoft.com/office/powerpoint/2010/main" id="1" dur="indefinite" restart="never" nodeType="tmRoot"/>
+        <p:cTn id="1" dur="indefinite" restart="never" nodeType="tmRoot"/>
       </p:par>
     </p:tnLst>
   </p:timing>
@@ -6496,13 +6500,13 @@
   <p:clrMapOvr>
     <a:masterClrMapping/>
   </p:clrMapOvr>
-  <p:transition xmlns:p14="http://schemas.microsoft.com/office/powerpoint/2010/main" spd="med">
+  <p:transition spd="med">
     <p:fade/>
   </p:transition>
   <p:timing>
     <p:tnLst>
       <p:par>
-        <p:cTn xmlns:p14="http://schemas.microsoft.com/office/powerpoint/2010/main" id="1" dur="indefinite" restart="never" nodeType="tmRoot"/>
+        <p:cTn id="1" dur="indefinite" restart="never" nodeType="tmRoot"/>
       </p:par>
     </p:tnLst>
   </p:timing>
@@ -6807,13 +6811,13 @@
   <p:clrMapOvr>
     <a:masterClrMapping/>
   </p:clrMapOvr>
-  <p:transition xmlns:p14="http://schemas.microsoft.com/office/powerpoint/2010/main" spd="med">
+  <p:transition spd="med">
     <p:fade/>
   </p:transition>
   <p:timing>
     <p:tnLst>
       <p:par>
-        <p:cTn xmlns:p14="http://schemas.microsoft.com/office/powerpoint/2010/main" id="1" dur="indefinite" restart="never" nodeType="tmRoot"/>
+        <p:cTn id="1" dur="indefinite" restart="never" nodeType="tmRoot"/>
       </p:par>
     </p:tnLst>
   </p:timing>
@@ -6890,14 +6894,14 @@
           </a:ln>
           <a:extLst>
             <a:ext uri="{909E8E84-426E-40dd-AFC4-6F175D3DCCD1}">
-              <a14:hiddenFill xmlns:a14="http://schemas.microsoft.com/office/drawing/2010/main">
+              <a14:hiddenFill xmlns:a14="http://schemas.microsoft.com/office/drawing/2010/main" xmlns="">
                 <a:solidFill>
                   <a:srgbClr val="FFFFFF"/>
                 </a:solidFill>
               </a14:hiddenFill>
             </a:ext>
             <a:ext uri="{91240B29-F687-4f45-9708-019B960494DF}">
-              <a14:hiddenLine xmlns:a14="http://schemas.microsoft.com/office/drawing/2010/main" w="9525">
+              <a14:hiddenLine xmlns:a14="http://schemas.microsoft.com/office/drawing/2010/main" xmlns="" w="9525">
                 <a:solidFill>
                   <a:srgbClr val="000000"/>
                 </a:solidFill>
@@ -7173,13 +7177,13 @@
   <p:clrMapOvr>
     <a:overrideClrMapping bg1="lt1" tx1="dk1" bg2="lt2" tx2="dk2" accent1="accent1" accent2="accent2" accent3="accent3" accent4="accent4" accent5="accent5" accent6="accent6" hlink="hlink" folHlink="folHlink"/>
   </p:clrMapOvr>
-  <p:transition xmlns:p14="http://schemas.microsoft.com/office/powerpoint/2010/main" spd="med">
+  <p:transition spd="med">
     <p:fade/>
   </p:transition>
   <p:timing>
     <p:tnLst>
       <p:par>
-        <p:cTn xmlns:p14="http://schemas.microsoft.com/office/powerpoint/2010/main" id="1" dur="indefinite" restart="never" nodeType="tmRoot"/>
+        <p:cTn id="1" dur="indefinite" restart="never" nodeType="tmRoot"/>
       </p:par>
     </p:tnLst>
   </p:timing>
@@ -7386,13 +7390,13 @@
   <p:clrMapOvr>
     <a:overrideClrMapping bg1="lt1" tx1="dk1" bg2="lt2" tx2="dk2" accent1="accent1" accent2="accent2" accent3="accent3" accent4="accent4" accent5="accent5" accent6="accent6" hlink="hlink" folHlink="folHlink"/>
   </p:clrMapOvr>
-  <p:transition xmlns:p14="http://schemas.microsoft.com/office/powerpoint/2010/main" spd="med">
+  <p:transition spd="med">
     <p:fade/>
   </p:transition>
   <p:timing>
     <p:tnLst>
       <p:par>
-        <p:cTn xmlns:p14="http://schemas.microsoft.com/office/powerpoint/2010/main" id="1" dur="indefinite" restart="never" nodeType="tmRoot"/>
+        <p:cTn id="1" dur="indefinite" restart="never" nodeType="tmRoot"/>
       </p:par>
     </p:tnLst>
   </p:timing>
@@ -7469,14 +7473,14 @@
           </a:ln>
           <a:extLst>
             <a:ext uri="{909E8E84-426E-40dd-AFC4-6F175D3DCCD1}">
-              <a14:hiddenFill xmlns:a14="http://schemas.microsoft.com/office/drawing/2010/main">
+              <a14:hiddenFill xmlns:a14="http://schemas.microsoft.com/office/drawing/2010/main" xmlns="">
                 <a:solidFill>
                   <a:srgbClr val="FFFFFF"/>
                 </a:solidFill>
               </a14:hiddenFill>
             </a:ext>
             <a:ext uri="{91240B29-F687-4f45-9708-019B960494DF}">
-              <a14:hiddenLine xmlns:a14="http://schemas.microsoft.com/office/drawing/2010/main" w="9525">
+              <a14:hiddenLine xmlns:a14="http://schemas.microsoft.com/office/drawing/2010/main" xmlns="" w="9525">
                 <a:solidFill>
                   <a:srgbClr val="000000"/>
                 </a:solidFill>
@@ -7759,13 +7763,13 @@
   <p:clrMapOvr>
     <a:overrideClrMapping bg1="lt1" tx1="dk1" bg2="lt2" tx2="dk2" accent1="accent1" accent2="accent2" accent3="accent3" accent4="accent4" accent5="accent5" accent6="accent6" hlink="hlink" folHlink="folHlink"/>
   </p:clrMapOvr>
-  <p:transition xmlns:p14="http://schemas.microsoft.com/office/powerpoint/2010/main" spd="med">
+  <p:transition spd="med">
     <p:fade/>
   </p:transition>
   <p:timing>
     <p:tnLst>
       <p:par>
-        <p:cTn xmlns:p14="http://schemas.microsoft.com/office/powerpoint/2010/main" id="1" dur="indefinite" restart="never" nodeType="tmRoot"/>
+        <p:cTn id="1" dur="indefinite" restart="never" nodeType="tmRoot"/>
       </p:par>
     </p:tnLst>
   </p:timing>
@@ -7974,13 +7978,13 @@
   <p:clrMapOvr>
     <a:overrideClrMapping bg1="lt1" tx1="dk1" bg2="lt2" tx2="dk2" accent1="accent1" accent2="accent2" accent3="accent3" accent4="accent4" accent5="accent5" accent6="accent6" hlink="hlink" folHlink="folHlink"/>
   </p:clrMapOvr>
-  <p:transition xmlns:p14="http://schemas.microsoft.com/office/powerpoint/2010/main" spd="med">
+  <p:transition spd="med">
     <p:fade/>
   </p:transition>
   <p:timing>
     <p:tnLst>
       <p:par>
-        <p:cTn xmlns:p14="http://schemas.microsoft.com/office/powerpoint/2010/main" id="1" dur="indefinite" restart="never" nodeType="tmRoot"/>
+        <p:cTn id="1" dur="indefinite" restart="never" nodeType="tmRoot"/>
       </p:par>
     </p:tnLst>
   </p:timing>
@@ -8057,14 +8061,14 @@
           </a:ln>
           <a:extLst>
             <a:ext uri="{909E8E84-426E-40dd-AFC4-6F175D3DCCD1}">
-              <a14:hiddenFill xmlns:a14="http://schemas.microsoft.com/office/drawing/2010/main">
+              <a14:hiddenFill xmlns:a14="http://schemas.microsoft.com/office/drawing/2010/main" xmlns="">
                 <a:solidFill>
                   <a:srgbClr val="FFFFFF"/>
                 </a:solidFill>
               </a14:hiddenFill>
             </a:ext>
             <a:ext uri="{91240B29-F687-4f45-9708-019B960494DF}">
-              <a14:hiddenLine xmlns:a14="http://schemas.microsoft.com/office/drawing/2010/main" w="9525">
+              <a14:hiddenLine xmlns:a14="http://schemas.microsoft.com/office/drawing/2010/main" xmlns="" w="9525">
                 <a:solidFill>
                   <a:srgbClr val="000000"/>
                 </a:solidFill>
@@ -8332,13 +8336,13 @@
   <p:clrMapOvr>
     <a:overrideClrMapping bg1="lt1" tx1="dk1" bg2="lt2" tx2="dk2" accent1="accent1" accent2="accent2" accent3="accent3" accent4="accent4" accent5="accent5" accent6="accent6" hlink="hlink" folHlink="folHlink"/>
   </p:clrMapOvr>
-  <p:transition xmlns:p14="http://schemas.microsoft.com/office/powerpoint/2010/main" spd="med">
+  <p:transition spd="med">
     <p:fade/>
   </p:transition>
   <p:timing>
     <p:tnLst>
       <p:par>
-        <p:cTn xmlns:p14="http://schemas.microsoft.com/office/powerpoint/2010/main" id="1" dur="indefinite" restart="never" nodeType="tmRoot"/>
+        <p:cTn id="1" dur="indefinite" restart="never" nodeType="tmRoot"/>
       </p:par>
     </p:tnLst>
   </p:timing>
@@ -8567,13 +8571,13 @@
   <p:clrMapOvr>
     <a:overrideClrMapping bg1="lt1" tx1="dk1" bg2="lt2" tx2="dk2" accent1="accent1" accent2="accent2" accent3="accent3" accent4="accent4" accent5="accent5" accent6="accent6" hlink="hlink" folHlink="folHlink"/>
   </p:clrMapOvr>
-  <p:transition xmlns:p14="http://schemas.microsoft.com/office/powerpoint/2010/main" spd="med">
+  <p:transition spd="med">
     <p:fade/>
   </p:transition>
   <p:timing>
     <p:tnLst>
       <p:par>
-        <p:cTn xmlns:p14="http://schemas.microsoft.com/office/powerpoint/2010/main" id="1" dur="indefinite" restart="never" nodeType="tmRoot"/>
+        <p:cTn id="1" dur="indefinite" restart="never" nodeType="tmRoot"/>
       </p:par>
     </p:tnLst>
   </p:timing>
@@ -8862,13 +8866,13 @@
   <p:clrMapOvr>
     <a:overrideClrMapping bg1="lt1" tx1="dk1" bg2="lt2" tx2="dk2" accent1="accent1" accent2="accent2" accent3="accent3" accent4="accent4" accent5="accent5" accent6="accent6" hlink="hlink" folHlink="folHlink"/>
   </p:clrMapOvr>
-  <p:transition xmlns:p14="http://schemas.microsoft.com/office/powerpoint/2010/main" spd="med">
+  <p:transition spd="med">
     <p:fade/>
   </p:transition>
   <p:timing>
     <p:tnLst>
       <p:par>
-        <p:cTn xmlns:p14="http://schemas.microsoft.com/office/powerpoint/2010/main" id="1" dur="indefinite" restart="never" nodeType="tmRoot"/>
+        <p:cTn id="1" dur="indefinite" restart="never" nodeType="tmRoot"/>
       </p:par>
     </p:tnLst>
   </p:timing>
@@ -9025,14 +9029,14 @@
           </a:ln>
           <a:extLst>
             <a:ext uri="{909E8E84-426E-40dd-AFC4-6F175D3DCCD1}">
-              <a14:hiddenFill xmlns:a14="http://schemas.microsoft.com/office/drawing/2010/main">
+              <a14:hiddenFill xmlns:a14="http://schemas.microsoft.com/office/drawing/2010/main" xmlns="">
                 <a:solidFill>
                   <a:srgbClr val="FFFFFF"/>
                 </a:solidFill>
               </a14:hiddenFill>
             </a:ext>
             <a:ext uri="{91240B29-F687-4f45-9708-019B960494DF}">
-              <a14:hiddenLine xmlns:a14="http://schemas.microsoft.com/office/drawing/2010/main" w="9525">
+              <a14:hiddenLine xmlns:a14="http://schemas.microsoft.com/office/drawing/2010/main" xmlns="" w="9525">
                 <a:solidFill>
                   <a:srgbClr val="000000"/>
                 </a:solidFill>
@@ -9260,13 +9264,13 @@
     <p:sldLayoutId id="2147483841" r:id="rId11"/>
     <p:sldLayoutId id="2147483843" r:id="rId12"/>
   </p:sldLayoutIdLst>
-  <p:transition xmlns:p14="http://schemas.microsoft.com/office/powerpoint/2010/main" spd="med">
+  <p:transition spd="med">
     <p:fade/>
   </p:transition>
   <p:timing>
     <p:tnLst>
       <p:par>
-        <p:cTn xmlns:p14="http://schemas.microsoft.com/office/powerpoint/2010/main" id="1" dur="indefinite" restart="never" nodeType="tmRoot"/>
+        <p:cTn id="1" dur="indefinite" restart="never" nodeType="tmRoot"/>
       </p:par>
     </p:tnLst>
   </p:timing>
@@ -9794,14 +9798,14 @@
           </a:ln>
           <a:extLst>
             <a:ext uri="{909E8E84-426E-40dd-AFC4-6F175D3DCCD1}">
-              <a14:hiddenFill xmlns:a14="http://schemas.microsoft.com/office/drawing/2010/main">
+              <a14:hiddenFill xmlns:a14="http://schemas.microsoft.com/office/drawing/2010/main" xmlns="">
                 <a:solidFill>
                   <a:srgbClr val="FFFFFF"/>
                 </a:solidFill>
               </a14:hiddenFill>
             </a:ext>
             <a:ext uri="{91240B29-F687-4f45-9708-019B960494DF}">
-              <a14:hiddenLine xmlns:a14="http://schemas.microsoft.com/office/drawing/2010/main" w="9525">
+              <a14:hiddenLine xmlns:a14="http://schemas.microsoft.com/office/drawing/2010/main" xmlns="" w="9525">
                 <a:solidFill>
                   <a:srgbClr val="000000"/>
                 </a:solidFill>
@@ -10100,13 +10104,13 @@
     <p:sldLayoutId id="2147483856" r:id="rId7"/>
     <p:sldLayoutId id="2147483866" r:id="rId8"/>
   </p:sldLayoutIdLst>
-  <p:transition xmlns:p14="http://schemas.microsoft.com/office/powerpoint/2010/main" spd="med">
+  <p:transition spd="med">
     <p:fade/>
   </p:transition>
   <p:timing>
     <p:tnLst>
       <p:par>
-        <p:cTn xmlns:p14="http://schemas.microsoft.com/office/powerpoint/2010/main" id="1" dur="indefinite" restart="never" nodeType="tmRoot"/>
+        <p:cTn id="1" dur="indefinite" restart="never" nodeType="tmRoot"/>
       </p:par>
     </p:tnLst>
   </p:timing>
@@ -10630,13 +10634,13 @@
   <p:clrMapOvr>
     <a:masterClrMapping/>
   </p:clrMapOvr>
-  <p:transition xmlns:p14="http://schemas.microsoft.com/office/powerpoint/2010/main" spd="med">
+  <p:transition spd="med">
     <p:fade/>
   </p:transition>
   <p:timing>
     <p:tnLst>
       <p:par>
-        <p:cTn xmlns:p14="http://schemas.microsoft.com/office/powerpoint/2010/main" id="1" dur="indefinite" restart="never" nodeType="tmRoot"/>
+        <p:cTn id="1" dur="indefinite" restart="never" nodeType="tmRoot"/>
       </p:par>
     </p:tnLst>
   </p:timing>
@@ -10727,13 +10731,13 @@
   <p:clrMapOvr>
     <a:masterClrMapping/>
   </p:clrMapOvr>
-  <p:transition xmlns:p14="http://schemas.microsoft.com/office/powerpoint/2010/main" spd="med">
+  <p:transition spd="med">
     <p:fade/>
   </p:transition>
   <p:timing>
     <p:tnLst>
       <p:par>
-        <p:cTn xmlns:p14="http://schemas.microsoft.com/office/powerpoint/2010/main" id="1" dur="indefinite" restart="never" nodeType="tmRoot"/>
+        <p:cTn id="1" dur="indefinite" restart="never" nodeType="tmRoot"/>
       </p:par>
     </p:tnLst>
   </p:timing>
@@ -10815,13 +10819,13 @@
   <p:clrMapOvr>
     <a:masterClrMapping/>
   </p:clrMapOvr>
-  <p:transition xmlns:p14="http://schemas.microsoft.com/office/powerpoint/2010/main" spd="med">
+  <p:transition spd="med">
     <p:fade/>
   </p:transition>
   <p:timing>
     <p:tnLst>
       <p:par>
-        <p:cTn xmlns:p14="http://schemas.microsoft.com/office/powerpoint/2010/main" id="1" dur="indefinite" restart="never" nodeType="tmRoot"/>
+        <p:cTn id="1" dur="indefinite" restart="never" nodeType="tmRoot"/>
       </p:par>
     </p:tnLst>
   </p:timing>
@@ -10855,13 +10859,13 @@
   <p:clrMapOvr>
     <a:masterClrMapping/>
   </p:clrMapOvr>
-  <p:transition xmlns:p14="http://schemas.microsoft.com/office/powerpoint/2010/main" spd="med">
+  <p:transition spd="med">
     <p:fade/>
   </p:transition>
   <p:timing>
     <p:tnLst>
       <p:par>
-        <p:cTn xmlns:p14="http://schemas.microsoft.com/office/powerpoint/2010/main" id="1" dur="indefinite" restart="never" nodeType="tmRoot"/>
+        <p:cTn id="1" dur="indefinite" restart="never" nodeType="tmRoot"/>
       </p:par>
     </p:tnLst>
   </p:timing>
@@ -10965,13 +10969,13 @@
   <p:clrMapOvr>
     <a:masterClrMapping/>
   </p:clrMapOvr>
-  <p:transition xmlns:p14="http://schemas.microsoft.com/office/powerpoint/2010/main" spd="med">
+  <p:transition spd="med">
     <p:fade/>
   </p:transition>
   <p:timing>
     <p:tnLst>
       <p:par>
-        <p:cTn xmlns:p14="http://schemas.microsoft.com/office/powerpoint/2010/main" id="1" dur="indefinite" restart="never" nodeType="tmRoot"/>
+        <p:cTn id="1" dur="indefinite" restart="never" nodeType="tmRoot"/>
       </p:par>
     </p:tnLst>
   </p:timing>
@@ -11075,13 +11079,13 @@
   <p:clrMapOvr>
     <a:masterClrMapping/>
   </p:clrMapOvr>
-  <p:transition xmlns:p14="http://schemas.microsoft.com/office/powerpoint/2010/main" spd="med">
+  <p:transition spd="med">
     <p:fade/>
   </p:transition>
   <p:timing>
     <p:tnLst>
       <p:par>
-        <p:cTn xmlns:p14="http://schemas.microsoft.com/office/powerpoint/2010/main" id="1" dur="indefinite" restart="never" nodeType="tmRoot"/>
+        <p:cTn id="1" dur="indefinite" restart="never" nodeType="tmRoot"/>
       </p:par>
     </p:tnLst>
   </p:timing>
@@ -11178,13 +11182,13 @@
   <p:clrMapOvr>
     <a:masterClrMapping/>
   </p:clrMapOvr>
-  <p:transition xmlns:p14="http://schemas.microsoft.com/office/powerpoint/2010/main" spd="med">
+  <p:transition spd="med">
     <p:fade/>
   </p:transition>
   <p:timing>
     <p:tnLst>
       <p:par>
-        <p:cTn xmlns:p14="http://schemas.microsoft.com/office/powerpoint/2010/main" id="1" dur="indefinite" restart="never" nodeType="tmRoot"/>
+        <p:cTn id="1" dur="indefinite" restart="never" nodeType="tmRoot"/>
       </p:par>
     </p:tnLst>
   </p:timing>
@@ -11319,13 +11323,13 @@
   <p:clrMapOvr>
     <a:masterClrMapping/>
   </p:clrMapOvr>
-  <p:transition xmlns:p14="http://schemas.microsoft.com/office/powerpoint/2010/main" spd="med">
+  <p:transition spd="med">
     <p:fade/>
   </p:transition>
   <p:timing>
     <p:tnLst>
       <p:par>
-        <p:cTn xmlns:p14="http://schemas.microsoft.com/office/powerpoint/2010/main" id="1" dur="indefinite" restart="never" nodeType="tmRoot"/>
+        <p:cTn id="1" dur="indefinite" restart="never" nodeType="tmRoot"/>
       </p:par>
     </p:tnLst>
   </p:timing>
@@ -11380,7 +11384,6 @@
               <a:rPr lang="en-US" dirty="0" smtClean="0"/>
               <a:t>Why Use Custom Resources</a:t>
             </a:r>
-            <a:endParaRPr lang="en-US" dirty="0" smtClean="0"/>
           </a:p>
           <a:p>
             <a:r>
@@ -11393,7 +11396,6 @@
               <a:rPr lang="en-US" dirty="0" smtClean="0"/>
               <a:t>Refining a Custom Resource</a:t>
             </a:r>
-            <a:endParaRPr lang="en-US" dirty="0" smtClean="0"/>
           </a:p>
           <a:p>
             <a:endParaRPr lang="en-US" dirty="0" smtClean="0"/>
@@ -11428,11 +11430,7 @@
             </a:r>
             <a:r>
               <a:rPr lang="en-US" dirty="0" smtClean="0"/>
-              <a:t> </a:t>
-            </a:r>
-            <a:r>
-              <a:rPr lang="en-US" dirty="0" smtClean="0"/>
-              <a:t>Plugins</a:t>
+              <a:t> Plugins</a:t>
             </a:r>
           </a:p>
           <a:p>
@@ -11446,11 +11444,7 @@
             </a:r>
             <a:r>
               <a:rPr lang="en-US" dirty="0" smtClean="0"/>
-              <a:t> </a:t>
-            </a:r>
-            <a:r>
-              <a:rPr lang="en-US" dirty="0" smtClean="0"/>
-              <a:t>Plugin</a:t>
+              <a:t> Plugin</a:t>
             </a:r>
           </a:p>
           <a:p>
@@ -11522,13 +11516,13 @@
   <p:clrMapOvr>
     <a:masterClrMapping/>
   </p:clrMapOvr>
-  <p:transition xmlns:p14="http://schemas.microsoft.com/office/powerpoint/2010/main" spd="med">
+  <p:transition spd="med">
     <p:fade/>
   </p:transition>
   <p:timing>
     <p:tnLst>
       <p:par>
-        <p:cTn xmlns:p14="http://schemas.microsoft.com/office/powerpoint/2010/main" id="1" dur="indefinite" restart="never" nodeType="tmRoot"/>
+        <p:cTn id="1" dur="indefinite" restart="never" nodeType="tmRoot"/>
       </p:par>
     </p:tnLst>
   </p:timing>
@@ -11639,13 +11633,13 @@
   <p:clrMapOvr>
     <a:masterClrMapping/>
   </p:clrMapOvr>
-  <p:transition xmlns:p14="http://schemas.microsoft.com/office/powerpoint/2010/main" spd="med">
+  <p:transition spd="med">
     <p:fade/>
   </p:transition>
   <p:timing>
     <p:tnLst>
       <p:par>
-        <p:cTn xmlns:p14="http://schemas.microsoft.com/office/powerpoint/2010/main" id="1" dur="indefinite" restart="never" nodeType="tmRoot"/>
+        <p:cTn id="1" dur="indefinite" restart="never" nodeType="tmRoot"/>
       </p:par>
     </p:tnLst>
   </p:timing>
@@ -11806,13 +11800,13 @@
   <p:clrMapOvr>
     <a:masterClrMapping/>
   </p:clrMapOvr>
-  <p:transition xmlns:p14="http://schemas.microsoft.com/office/powerpoint/2010/main" spd="med">
+  <p:transition spd="med">
     <p:fade/>
   </p:transition>
   <p:timing>
     <p:tnLst>
       <p:par>
-        <p:cTn xmlns:p14="http://schemas.microsoft.com/office/powerpoint/2010/main" id="1" dur="indefinite" restart="never" nodeType="tmRoot"/>
+        <p:cTn id="1" dur="indefinite" restart="never" nodeType="tmRoot"/>
       </p:par>
     </p:tnLst>
   </p:timing>
@@ -11927,13 +11921,13 @@
   <p:clrMapOvr>
     <a:masterClrMapping/>
   </p:clrMapOvr>
-  <p:transition xmlns:p14="http://schemas.microsoft.com/office/powerpoint/2010/main" spd="med">
+  <p:transition spd="med">
     <p:fade/>
   </p:transition>
   <p:timing>
     <p:tnLst>
       <p:par>
-        <p:cTn xmlns:p14="http://schemas.microsoft.com/office/powerpoint/2010/main" id="1" dur="indefinite" restart="never" nodeType="tmRoot"/>
+        <p:cTn id="1" dur="indefinite" restart="never" nodeType="tmRoot"/>
       </p:par>
     </p:tnLst>
   </p:timing>
@@ -12316,7 +12310,7 @@
   <a:extraClrSchemeLst/>
   <a:extLst>
     <a:ext uri="{05A4C25C-085E-4340-85A3-A5531E510DB2}">
-      <thm15:themeFamily xmlns:thm15="http://schemas.microsoft.com/office/thememl/2012/main" xmlns="" name="Chef-TemplateComps_v09-16x9-Light.potx" id="{078CEFDB-FA7A-4E36-9964-13EF367585CB}" vid="{8B87B0F3-7308-43D5-8388-E1B49EA02652}"/>
+      <thm15:themeFamily xmlns:thm15="http://schemas.microsoft.com/office/thememl/2012/main" name="Chef-TemplateComps_v09-16x9-Light.potx" id="{078CEFDB-FA7A-4E36-9964-13EF367585CB}" vid="{8B87B0F3-7308-43D5-8388-E1B49EA02652}"/>
     </a:ext>
   </a:extLst>
 </a:theme>
@@ -12698,7 +12692,7 @@
   <a:extraClrSchemeLst/>
   <a:extLst>
     <a:ext uri="{05A4C25C-085E-4340-85A3-A5531E510DB2}">
-      <thm15:themeFamily xmlns:thm15="http://schemas.microsoft.com/office/thememl/2012/main" xmlns="" name="Chef-TemplateComps_v09-16x9-Light.potx" id="{078CEFDB-FA7A-4E36-9964-13EF367585CB}" vid="{8B87B0F3-7308-43D5-8388-E1B49EA02652}"/>
+      <thm15:themeFamily xmlns:thm15="http://schemas.microsoft.com/office/thememl/2012/main" name="Chef-TemplateComps_v09-16x9-Light.potx" id="{078CEFDB-FA7A-4E36-9964-13EF367585CB}" vid="{8B87B0F3-7308-43D5-8388-E1B49EA02652}"/>
     </a:ext>
   </a:extLst>
 </a:theme>

</xml_diff>

<commit_message>
Updates the slides to new export and copyright year
The slides are now formatted for easy creation to handouts.
The copyright year is 2017.

Signed-off-by: Franklin Webber <franklin@chef.io>
</commit_message>
<xml_diff>
--- a/01-introduction.pptx
+++ b/01-introduction.pptx
@@ -236,6 +236,10 @@
             <a:pPr>
               <a:defRPr/>
             </a:pPr>
+            <a:r>
+              <a:rPr lang="en-US" smtClean="0"/>
+              <a:t>Extending Cookbooks</a:t>
+            </a:r>
             <a:endParaRPr lang="en-US"/>
           </a:p>
         </p:txBody>
@@ -280,13 +284,10 @@
             <a:pPr>
               <a:defRPr/>
             </a:pPr>
-            <a:fld id="{04CB1577-BF96-2D40-B4CA-2BF6DA80CBA7}" type="datetime1">
-              <a:rPr lang="en-CA"/>
-              <a:pPr>
-                <a:defRPr/>
-              </a:pPr>
-              <a:t>2016-10-22</a:t>
-            </a:fld>
+            <a:r>
+              <a:rPr lang="en-US" smtClean="0"/>
+              <a:t>Chef Software, Inc.</a:t>
+            </a:r>
             <a:endParaRPr lang="en-US" dirty="0"/>
           </a:p>
         </p:txBody>
@@ -397,7 +398,7 @@
     </p:extLst>
   </p:cSld>
   <p:clrMap bg1="lt1" tx1="dk1" bg2="lt2" tx2="dk2" accent1="accent1" accent2="accent2" accent3="accent3" accent4="accent4" accent5="accent5" accent6="accent6" hlink="hlink" folHlink="folHlink"/>
-  <p:hf dt="0"/>
+  <p:hf sldNum="0" ftr="0"/>
 </p:handoutMaster>
 </file>
 
@@ -435,7 +436,7 @@
         </p:nvSpPr>
         <p:spPr>
           <a:xfrm>
-            <a:off x="3884613" y="0"/>
+            <a:off x="3884613" y="108860"/>
             <a:ext cx="2971800" cy="457200"/>
           </a:xfrm>
           <a:prstGeom prst="rect">
@@ -463,13 +464,10 @@
             <a:pPr>
               <a:defRPr/>
             </a:pPr>
-            <a:fld id="{72FDBE47-C34F-CF4A-9709-1411AD5B3286}" type="datetime1">
-              <a:rPr lang="en-CA"/>
-              <a:pPr>
-                <a:defRPr/>
-              </a:pPr>
-              <a:t>2016-10-22</a:t>
-            </a:fld>
+            <a:r>
+              <a:rPr lang="en-US" smtClean="0"/>
+              <a:t>Chef Software, Inc.</a:t>
+            </a:r>
             <a:endParaRPr lang="en-US" dirty="0"/>
           </a:p>
         </p:txBody>
@@ -520,8 +518,8 @@
         </p:nvSpPr>
         <p:spPr>
           <a:xfrm>
-            <a:off x="685800" y="4343400"/>
-            <a:ext cx="5486400" cy="4114800"/>
+            <a:off x="381000" y="4343400"/>
+            <a:ext cx="6096000" cy="4114800"/>
           </a:xfrm>
           <a:prstGeom prst="rect">
             <a:avLst/>
@@ -572,68 +570,17 @@
       </p:sp>
       <p:sp>
         <p:nvSpPr>
-          <p:cNvPr id="7" name="Slide Number Placeholder 6"/>
+          <p:cNvPr id="8" name="Header Placeholder 1"/>
           <p:cNvSpPr>
             <a:spLocks noGrp="1"/>
           </p:cNvSpPr>
           <p:nvPr>
-            <p:ph type="sldNum" sz="quarter" idx="5"/>
+            <p:ph type="hdr" sz="quarter"/>
           </p:nvPr>
         </p:nvSpPr>
         <p:spPr>
           <a:xfrm>
-            <a:off x="6172200" y="8685213"/>
-            <a:ext cx="684213" cy="457200"/>
-          </a:xfrm>
-          <a:prstGeom prst="rect">
-            <a:avLst/>
-          </a:prstGeom>
-        </p:spPr>
-        <p:txBody>
-          <a:bodyPr vert="horz" lIns="91440" tIns="45720" rIns="91440" bIns="45720" rtlCol="0" anchor="b"/>
-          <a:lstStyle>
-            <a:lvl1pPr algn="r" defTabSz="1219120" fontAlgn="auto">
-              <a:spcBef>
-                <a:spcPts val="0"/>
-              </a:spcBef>
-              <a:spcAft>
-                <a:spcPts val="0"/>
-              </a:spcAft>
-              <a:defRPr sz="1200" smtClean="0">
-                <a:latin typeface="Arial" panose="020B0604020202020204" pitchFamily="34" charset="0"/>
-                <a:ea typeface="+mn-ea"/>
-                <a:cs typeface="Arial" panose="020B0604020202020204" pitchFamily="34" charset="0"/>
-              </a:defRPr>
-            </a:lvl1pPr>
-          </a:lstStyle>
-          <a:p>
-            <a:pPr>
-              <a:defRPr/>
-            </a:pPr>
-            <a:fld id="{DC3734AA-3150-D947-AC52-2F5DF48BFCD5}" type="slidenum">
-              <a:rPr lang="en-US"/>
-              <a:pPr>
-                <a:defRPr/>
-              </a:pPr>
-              <a:t>‹#›</a:t>
-            </a:fld>
-            <a:endParaRPr lang="en-US" dirty="0"/>
-          </a:p>
-        </p:txBody>
-      </p:sp>
-      <p:sp>
-        <p:nvSpPr>
-          <p:cNvPr id="8" name="Header Placeholder 1"/>
-          <p:cNvSpPr>
-            <a:spLocks noGrp="1"/>
-          </p:cNvSpPr>
-          <p:nvPr>
-            <p:ph type="hdr" sz="quarter"/>
-          </p:nvPr>
-        </p:nvSpPr>
-        <p:spPr>
-          <a:xfrm>
-            <a:off x="0" y="0"/>
+            <a:off x="0" y="108860"/>
             <a:ext cx="2971800" cy="457200"/>
           </a:xfrm>
           <a:prstGeom prst="rect">
@@ -661,53 +608,10 @@
             <a:pPr>
               <a:defRPr/>
             </a:pPr>
-            <a:endParaRPr lang="en-US"/>
-          </a:p>
-        </p:txBody>
-      </p:sp>
-      <p:sp>
-        <p:nvSpPr>
-          <p:cNvPr id="9" name="Footer Placeholder 3"/>
-          <p:cNvSpPr>
-            <a:spLocks noGrp="1"/>
-          </p:cNvSpPr>
-          <p:nvPr>
-            <p:ph type="ftr" sz="quarter" idx="4"/>
-          </p:nvPr>
-        </p:nvSpPr>
-        <p:spPr>
-          <a:xfrm>
-            <a:off x="0" y="8685213"/>
-            <a:ext cx="6248400" cy="457200"/>
-          </a:xfrm>
-          <a:prstGeom prst="rect">
-            <a:avLst/>
-          </a:prstGeom>
-        </p:spPr>
-        <p:txBody>
-          <a:bodyPr vert="horz" lIns="91440" tIns="45720" rIns="91440" bIns="45720" rtlCol="0" anchor="b"/>
-          <a:lstStyle>
-            <a:lvl1pPr algn="l" defTabSz="1219120" fontAlgn="auto">
-              <a:spcBef>
-                <a:spcPts val="0"/>
-              </a:spcBef>
-              <a:spcAft>
-                <a:spcPts val="0"/>
-              </a:spcAft>
-              <a:defRPr sz="900" dirty="0" smtClean="0">
-                <a:solidFill>
-                  <a:srgbClr val="000000"/>
-                </a:solidFill>
-                <a:latin typeface="Arial" panose="020B0604020202020204" pitchFamily="34" charset="0"/>
-                <a:ea typeface="+mn-ea"/>
-                <a:cs typeface="Arial" panose="020B0604020202020204" pitchFamily="34" charset="0"/>
-              </a:defRPr>
-            </a:lvl1pPr>
-          </a:lstStyle>
-          <a:p>
-            <a:pPr>
-              <a:defRPr/>
-            </a:pPr>
+            <a:r>
+              <a:rPr lang="en-US" smtClean="0"/>
+              <a:t>Extending Cookbooks</a:t>
+            </a:r>
             <a:endParaRPr lang="en-US"/>
           </a:p>
         </p:txBody>
@@ -720,7 +624,7 @@
     </p:extLst>
   </p:cSld>
   <p:clrMap bg1="lt1" tx1="dk1" bg2="lt2" tx2="dk2" accent1="accent1" accent2="accent2" accent3="accent3" accent4="accent4" accent5="accent5" accent6="accent6" hlink="hlink" folHlink="folHlink"/>
-  <p:hf dt="0"/>
+  <p:hf sldNum="0" ftr="0"/>
   <p:notesStyle>
     <a:lvl1pPr algn="l" defTabSz="1217613" rtl="0" fontAlgn="base">
       <a:lnSpc>
@@ -919,11 +823,7 @@
             </a:r>
             <a:r>
               <a:rPr lang="en-US" baseline="0" dirty="0" smtClean="0"/>
-              <a:t> </a:t>
-            </a:r>
-            <a:r>
-              <a:rPr lang="en-US" baseline="0" dirty="0" smtClean="0"/>
-              <a:t>Cookbooks.</a:t>
+              <a:t> Cookbooks.</a:t>
             </a:r>
             <a:endParaRPr lang="en-US" dirty="0"/>
           </a:p>
@@ -931,12 +831,12 @@
       </p:sp>
       <p:sp>
         <p:nvSpPr>
-          <p:cNvPr id="4" name="Slide Number Placeholder 3"/>
+          <p:cNvPr id="5" name="Header Placeholder 4"/>
           <p:cNvSpPr>
             <a:spLocks noGrp="1"/>
           </p:cNvSpPr>
           <p:nvPr>
-            <p:ph type="sldNum" sz="quarter" idx="10"/>
+            <p:ph type="hdr" sz="quarter" idx="11"/>
           </p:nvPr>
         </p:nvSpPr>
         <p:spPr/>
@@ -947,25 +847,22 @@
             <a:pPr>
               <a:defRPr/>
             </a:pPr>
-            <a:fld id="{DC3734AA-3150-D947-AC52-2F5DF48BFCD5}" type="slidenum">
+            <a:r>
               <a:rPr lang="en-US" smtClean="0"/>
-              <a:pPr>
-                <a:defRPr/>
-              </a:pPr>
-              <a:t>1</a:t>
-            </a:fld>
-            <a:endParaRPr lang="en-US" dirty="0"/>
-          </a:p>
-        </p:txBody>
-      </p:sp>
-      <p:sp>
-        <p:nvSpPr>
-          <p:cNvPr id="5" name="Header Placeholder 4"/>
+              <a:t>Extending Cookbooks</a:t>
+            </a:r>
+            <a:endParaRPr lang="en-US"/>
+          </a:p>
+        </p:txBody>
+      </p:sp>
+      <p:sp>
+        <p:nvSpPr>
+          <p:cNvPr id="7" name="Date Placeholder 6"/>
           <p:cNvSpPr>
             <a:spLocks noGrp="1"/>
           </p:cNvSpPr>
           <p:nvPr>
-            <p:ph type="hdr" sz="quarter" idx="11"/>
+            <p:ph type="dt" idx="13"/>
           </p:nvPr>
         </p:nvSpPr>
         <p:spPr/>
@@ -976,29 +873,11 @@
             <a:pPr>
               <a:defRPr/>
             </a:pPr>
-            <a:endParaRPr lang="en-US"/>
-          </a:p>
-        </p:txBody>
-      </p:sp>
-      <p:sp>
-        <p:nvSpPr>
-          <p:cNvPr id="6" name="Footer Placeholder 5"/>
-          <p:cNvSpPr>
-            <a:spLocks noGrp="1"/>
-          </p:cNvSpPr>
-          <p:nvPr>
-            <p:ph type="ftr" sz="quarter" idx="12"/>
-          </p:nvPr>
-        </p:nvSpPr>
-        <p:spPr/>
-        <p:txBody>
-          <a:bodyPr/>
-          <a:lstStyle/>
-          <a:p>
-            <a:pPr>
-              <a:defRPr/>
-            </a:pPr>
-            <a:endParaRPr lang="en-US"/>
+            <a:r>
+              <a:rPr lang="en-US" smtClean="0"/>
+              <a:t>Chef Software, Inc.</a:t>
+            </a:r>
+            <a:endParaRPr lang="en-US" dirty="0"/>
           </a:p>
         </p:txBody>
       </p:sp>
@@ -1086,12 +965,12 @@
       </p:sp>
       <p:sp>
         <p:nvSpPr>
-          <p:cNvPr id="4" name="Slide Number Placeholder 3"/>
+          <p:cNvPr id="5" name="Header Placeholder 4"/>
           <p:cNvSpPr>
             <a:spLocks noGrp="1"/>
           </p:cNvSpPr>
           <p:nvPr>
-            <p:ph type="sldNum" sz="quarter" idx="10"/>
+            <p:ph type="hdr" sz="quarter" idx="11"/>
           </p:nvPr>
         </p:nvSpPr>
         <p:spPr/>
@@ -1102,25 +981,22 @@
             <a:pPr>
               <a:defRPr/>
             </a:pPr>
-            <a:fld id="{DC3734AA-3150-D947-AC52-2F5DF48BFCD5}" type="slidenum">
+            <a:r>
               <a:rPr lang="en-US" smtClean="0"/>
-              <a:pPr>
-                <a:defRPr/>
-              </a:pPr>
-              <a:t>10</a:t>
-            </a:fld>
-            <a:endParaRPr lang="en-US" dirty="0"/>
-          </a:p>
-        </p:txBody>
-      </p:sp>
-      <p:sp>
-        <p:nvSpPr>
-          <p:cNvPr id="5" name="Header Placeholder 4"/>
+              <a:t>Extending Cookbooks</a:t>
+            </a:r>
+            <a:endParaRPr lang="en-US"/>
+          </a:p>
+        </p:txBody>
+      </p:sp>
+      <p:sp>
+        <p:nvSpPr>
+          <p:cNvPr id="7" name="Date Placeholder 6"/>
           <p:cNvSpPr>
             <a:spLocks noGrp="1"/>
           </p:cNvSpPr>
           <p:nvPr>
-            <p:ph type="hdr" sz="quarter" idx="11"/>
+            <p:ph type="dt" idx="13"/>
           </p:nvPr>
         </p:nvSpPr>
         <p:spPr/>
@@ -1131,29 +1007,11 @@
             <a:pPr>
               <a:defRPr/>
             </a:pPr>
-            <a:endParaRPr lang="en-US"/>
-          </a:p>
-        </p:txBody>
-      </p:sp>
-      <p:sp>
-        <p:nvSpPr>
-          <p:cNvPr id="6" name="Footer Placeholder 5"/>
-          <p:cNvSpPr>
-            <a:spLocks noGrp="1"/>
-          </p:cNvSpPr>
-          <p:nvPr>
-            <p:ph type="ftr" sz="quarter" idx="12"/>
-          </p:nvPr>
-        </p:nvSpPr>
-        <p:spPr/>
-        <p:txBody>
-          <a:bodyPr/>
-          <a:lstStyle/>
-          <a:p>
-            <a:pPr>
-              <a:defRPr/>
-            </a:pPr>
-            <a:endParaRPr lang="en-US"/>
+            <a:r>
+              <a:rPr lang="en-US" smtClean="0"/>
+              <a:t>Chef Software, Inc.</a:t>
+            </a:r>
+            <a:endParaRPr lang="en-US" dirty="0"/>
           </a:p>
         </p:txBody>
       </p:sp>
@@ -1232,12 +1090,12 @@
       </p:sp>
       <p:sp>
         <p:nvSpPr>
-          <p:cNvPr id="4" name="Slide Number Placeholder 3"/>
+          <p:cNvPr id="5" name="Header Placeholder 4"/>
           <p:cNvSpPr>
             <a:spLocks noGrp="1"/>
           </p:cNvSpPr>
           <p:nvPr>
-            <p:ph type="sldNum" sz="quarter" idx="10"/>
+            <p:ph type="hdr" sz="quarter" idx="11"/>
           </p:nvPr>
         </p:nvSpPr>
         <p:spPr/>
@@ -1248,25 +1106,22 @@
             <a:pPr>
               <a:defRPr/>
             </a:pPr>
-            <a:fld id="{DC3734AA-3150-D947-AC52-2F5DF48BFCD5}" type="slidenum">
+            <a:r>
               <a:rPr lang="en-US" smtClean="0"/>
-              <a:pPr>
-                <a:defRPr/>
-              </a:pPr>
-              <a:t>11</a:t>
-            </a:fld>
-            <a:endParaRPr lang="en-US" dirty="0"/>
-          </a:p>
-        </p:txBody>
-      </p:sp>
-      <p:sp>
-        <p:nvSpPr>
-          <p:cNvPr id="5" name="Header Placeholder 4"/>
+              <a:t>Extending Cookbooks</a:t>
+            </a:r>
+            <a:endParaRPr lang="en-US"/>
+          </a:p>
+        </p:txBody>
+      </p:sp>
+      <p:sp>
+        <p:nvSpPr>
+          <p:cNvPr id="7" name="Date Placeholder 6"/>
           <p:cNvSpPr>
             <a:spLocks noGrp="1"/>
           </p:cNvSpPr>
           <p:nvPr>
-            <p:ph type="hdr" sz="quarter" idx="11"/>
+            <p:ph type="dt" idx="13"/>
           </p:nvPr>
         </p:nvSpPr>
         <p:spPr/>
@@ -1277,29 +1132,11 @@
             <a:pPr>
               <a:defRPr/>
             </a:pPr>
-            <a:endParaRPr lang="en-US"/>
-          </a:p>
-        </p:txBody>
-      </p:sp>
-      <p:sp>
-        <p:nvSpPr>
-          <p:cNvPr id="6" name="Footer Placeholder 5"/>
-          <p:cNvSpPr>
-            <a:spLocks noGrp="1"/>
-          </p:cNvSpPr>
-          <p:nvPr>
-            <p:ph type="ftr" sz="quarter" idx="12"/>
-          </p:nvPr>
-        </p:nvSpPr>
-        <p:spPr/>
-        <p:txBody>
-          <a:bodyPr/>
-          <a:lstStyle/>
-          <a:p>
-            <a:pPr>
-              <a:defRPr/>
-            </a:pPr>
-            <a:endParaRPr lang="en-US"/>
+            <a:r>
+              <a:rPr lang="en-US" smtClean="0"/>
+              <a:t>Chef Software, Inc.</a:t>
+            </a:r>
+            <a:endParaRPr lang="en-US" dirty="0"/>
           </a:p>
         </p:txBody>
       </p:sp>
@@ -1366,12 +1203,12 @@
       </p:sp>
       <p:sp>
         <p:nvSpPr>
-          <p:cNvPr id="4" name="Slide Number Placeholder 3"/>
+          <p:cNvPr id="5" name="Header Placeholder 4"/>
           <p:cNvSpPr>
             <a:spLocks noGrp="1"/>
           </p:cNvSpPr>
           <p:nvPr>
-            <p:ph type="sldNum" sz="quarter" idx="10"/>
+            <p:ph type="hdr" sz="quarter" idx="11"/>
           </p:nvPr>
         </p:nvSpPr>
         <p:spPr/>
@@ -1382,25 +1219,22 @@
             <a:pPr>
               <a:defRPr/>
             </a:pPr>
-            <a:fld id="{DC3734AA-3150-D947-AC52-2F5DF48BFCD5}" type="slidenum">
+            <a:r>
               <a:rPr lang="en-US" smtClean="0"/>
-              <a:pPr>
-                <a:defRPr/>
-              </a:pPr>
-              <a:t>12</a:t>
-            </a:fld>
-            <a:endParaRPr lang="en-US" dirty="0"/>
-          </a:p>
-        </p:txBody>
-      </p:sp>
-      <p:sp>
-        <p:nvSpPr>
-          <p:cNvPr id="5" name="Header Placeholder 4"/>
+              <a:t>Extending Cookbooks</a:t>
+            </a:r>
+            <a:endParaRPr lang="en-US"/>
+          </a:p>
+        </p:txBody>
+      </p:sp>
+      <p:sp>
+        <p:nvSpPr>
+          <p:cNvPr id="7" name="Date Placeholder 6"/>
           <p:cNvSpPr>
             <a:spLocks noGrp="1"/>
           </p:cNvSpPr>
           <p:nvPr>
-            <p:ph type="hdr" sz="quarter" idx="11"/>
+            <p:ph type="dt" idx="13"/>
           </p:nvPr>
         </p:nvSpPr>
         <p:spPr/>
@@ -1411,29 +1245,11 @@
             <a:pPr>
               <a:defRPr/>
             </a:pPr>
-            <a:endParaRPr lang="en-US"/>
-          </a:p>
-        </p:txBody>
-      </p:sp>
-      <p:sp>
-        <p:nvSpPr>
-          <p:cNvPr id="6" name="Footer Placeholder 5"/>
-          <p:cNvSpPr>
-            <a:spLocks noGrp="1"/>
-          </p:cNvSpPr>
-          <p:nvPr>
-            <p:ph type="ftr" sz="quarter" idx="12"/>
-          </p:nvPr>
-        </p:nvSpPr>
-        <p:spPr/>
-        <p:txBody>
-          <a:bodyPr/>
-          <a:lstStyle/>
-          <a:p>
-            <a:pPr>
-              <a:defRPr/>
-            </a:pPr>
-            <a:endParaRPr lang="en-US"/>
+            <a:r>
+              <a:rPr lang="en-US" smtClean="0"/>
+              <a:t>Chef Software, Inc.</a:t>
+            </a:r>
+            <a:endParaRPr lang="en-US" dirty="0"/>
           </a:p>
         </p:txBody>
       </p:sp>
@@ -1517,12 +1333,12 @@
       </p:sp>
       <p:sp>
         <p:nvSpPr>
-          <p:cNvPr id="4" name="Slide Number Placeholder 3"/>
+          <p:cNvPr id="5" name="Header Placeholder 4"/>
           <p:cNvSpPr>
             <a:spLocks noGrp="1"/>
           </p:cNvSpPr>
           <p:nvPr>
-            <p:ph type="sldNum" sz="quarter" idx="10"/>
+            <p:ph type="hdr" sz="quarter" idx="11"/>
           </p:nvPr>
         </p:nvSpPr>
         <p:spPr/>
@@ -1533,25 +1349,22 @@
             <a:pPr>
               <a:defRPr/>
             </a:pPr>
-            <a:fld id="{DC3734AA-3150-D947-AC52-2F5DF48BFCD5}" type="slidenum">
+            <a:r>
               <a:rPr lang="en-US" smtClean="0"/>
-              <a:pPr>
-                <a:defRPr/>
-              </a:pPr>
-              <a:t>2</a:t>
-            </a:fld>
-            <a:endParaRPr lang="en-US" dirty="0"/>
-          </a:p>
-        </p:txBody>
-      </p:sp>
-      <p:sp>
-        <p:nvSpPr>
-          <p:cNvPr id="5" name="Header Placeholder 4"/>
+              <a:t>Extending Cookbooks</a:t>
+            </a:r>
+            <a:endParaRPr lang="en-US"/>
+          </a:p>
+        </p:txBody>
+      </p:sp>
+      <p:sp>
+        <p:nvSpPr>
+          <p:cNvPr id="7" name="Date Placeholder 6"/>
           <p:cNvSpPr>
             <a:spLocks noGrp="1"/>
           </p:cNvSpPr>
           <p:nvPr>
-            <p:ph type="hdr" sz="quarter" idx="11"/>
+            <p:ph type="dt" idx="13"/>
           </p:nvPr>
         </p:nvSpPr>
         <p:spPr/>
@@ -1562,29 +1375,11 @@
             <a:pPr>
               <a:defRPr/>
             </a:pPr>
-            <a:endParaRPr lang="en-US"/>
-          </a:p>
-        </p:txBody>
-      </p:sp>
-      <p:sp>
-        <p:nvSpPr>
-          <p:cNvPr id="6" name="Footer Placeholder 5"/>
-          <p:cNvSpPr>
-            <a:spLocks noGrp="1"/>
-          </p:cNvSpPr>
-          <p:nvPr>
-            <p:ph type="ftr" sz="quarter" idx="12"/>
-          </p:nvPr>
-        </p:nvSpPr>
-        <p:spPr/>
-        <p:txBody>
-          <a:bodyPr/>
-          <a:lstStyle/>
-          <a:p>
-            <a:pPr>
-              <a:defRPr/>
-            </a:pPr>
-            <a:endParaRPr lang="en-US"/>
+            <a:r>
+              <a:rPr lang="en-US" smtClean="0"/>
+              <a:t>Chef Software, Inc.</a:t>
+            </a:r>
+            <a:endParaRPr lang="en-US" dirty="0"/>
           </a:p>
         </p:txBody>
       </p:sp>
@@ -1685,12 +1480,12 @@
       </p:sp>
       <p:sp>
         <p:nvSpPr>
-          <p:cNvPr id="4" name="Slide Number Placeholder 3"/>
+          <p:cNvPr id="5" name="Header Placeholder 4"/>
           <p:cNvSpPr>
             <a:spLocks noGrp="1"/>
           </p:cNvSpPr>
           <p:nvPr>
-            <p:ph type="sldNum" sz="quarter" idx="10"/>
+            <p:ph type="hdr" sz="quarter" idx="11"/>
           </p:nvPr>
         </p:nvSpPr>
         <p:spPr/>
@@ -1701,25 +1496,22 @@
             <a:pPr>
               <a:defRPr/>
             </a:pPr>
-            <a:fld id="{DC3734AA-3150-D947-AC52-2F5DF48BFCD5}" type="slidenum">
+            <a:r>
               <a:rPr lang="en-US" smtClean="0"/>
-              <a:pPr>
-                <a:defRPr/>
-              </a:pPr>
-              <a:t>3</a:t>
-            </a:fld>
-            <a:endParaRPr lang="en-US" dirty="0"/>
-          </a:p>
-        </p:txBody>
-      </p:sp>
-      <p:sp>
-        <p:nvSpPr>
-          <p:cNvPr id="5" name="Header Placeholder 4"/>
+              <a:t>Extending Cookbooks</a:t>
+            </a:r>
+            <a:endParaRPr lang="en-US"/>
+          </a:p>
+        </p:txBody>
+      </p:sp>
+      <p:sp>
+        <p:nvSpPr>
+          <p:cNvPr id="7" name="Date Placeholder 6"/>
           <p:cNvSpPr>
             <a:spLocks noGrp="1"/>
           </p:cNvSpPr>
           <p:nvPr>
-            <p:ph type="hdr" sz="quarter" idx="11"/>
+            <p:ph type="dt" idx="13"/>
           </p:nvPr>
         </p:nvSpPr>
         <p:spPr/>
@@ -1730,29 +1522,11 @@
             <a:pPr>
               <a:defRPr/>
             </a:pPr>
-            <a:endParaRPr lang="en-US"/>
-          </a:p>
-        </p:txBody>
-      </p:sp>
-      <p:sp>
-        <p:nvSpPr>
-          <p:cNvPr id="6" name="Footer Placeholder 5"/>
-          <p:cNvSpPr>
-            <a:spLocks noGrp="1"/>
-          </p:cNvSpPr>
-          <p:nvPr>
-            <p:ph type="ftr" sz="quarter" idx="12"/>
-          </p:nvPr>
-        </p:nvSpPr>
-        <p:spPr/>
-        <p:txBody>
-          <a:bodyPr/>
-          <a:lstStyle/>
-          <a:p>
-            <a:pPr>
-              <a:defRPr/>
-            </a:pPr>
-            <a:endParaRPr lang="en-US"/>
+            <a:r>
+              <a:rPr lang="en-US" smtClean="0"/>
+              <a:t>Chef Software, Inc.</a:t>
+            </a:r>
+            <a:endParaRPr lang="en-US" dirty="0"/>
           </a:p>
         </p:txBody>
       </p:sp>
@@ -1835,12 +1609,12 @@
       </p:sp>
       <p:sp>
         <p:nvSpPr>
-          <p:cNvPr id="4" name="Slide Number Placeholder 3"/>
+          <p:cNvPr id="5" name="Header Placeholder 4"/>
           <p:cNvSpPr>
             <a:spLocks noGrp="1"/>
           </p:cNvSpPr>
           <p:nvPr>
-            <p:ph type="sldNum" sz="quarter" idx="10"/>
+            <p:ph type="hdr" sz="quarter" idx="11"/>
           </p:nvPr>
         </p:nvSpPr>
         <p:spPr/>
@@ -1851,25 +1625,22 @@
             <a:pPr>
               <a:defRPr/>
             </a:pPr>
-            <a:fld id="{DC3734AA-3150-D947-AC52-2F5DF48BFCD5}" type="slidenum">
+            <a:r>
               <a:rPr lang="en-US" smtClean="0"/>
-              <a:pPr>
-                <a:defRPr/>
-              </a:pPr>
-              <a:t>4</a:t>
-            </a:fld>
-            <a:endParaRPr lang="en-US" dirty="0"/>
-          </a:p>
-        </p:txBody>
-      </p:sp>
-      <p:sp>
-        <p:nvSpPr>
-          <p:cNvPr id="5" name="Header Placeholder 4"/>
+              <a:t>Extending Cookbooks</a:t>
+            </a:r>
+            <a:endParaRPr lang="en-US"/>
+          </a:p>
+        </p:txBody>
+      </p:sp>
+      <p:sp>
+        <p:nvSpPr>
+          <p:cNvPr id="7" name="Date Placeholder 6"/>
           <p:cNvSpPr>
             <a:spLocks noGrp="1"/>
           </p:cNvSpPr>
           <p:nvPr>
-            <p:ph type="hdr" sz="quarter" idx="11"/>
+            <p:ph type="dt" idx="13"/>
           </p:nvPr>
         </p:nvSpPr>
         <p:spPr/>
@@ -1880,29 +1651,11 @@
             <a:pPr>
               <a:defRPr/>
             </a:pPr>
-            <a:endParaRPr lang="en-US"/>
-          </a:p>
-        </p:txBody>
-      </p:sp>
-      <p:sp>
-        <p:nvSpPr>
-          <p:cNvPr id="6" name="Footer Placeholder 5"/>
-          <p:cNvSpPr>
-            <a:spLocks noGrp="1"/>
-          </p:cNvSpPr>
-          <p:nvPr>
-            <p:ph type="ftr" sz="quarter" idx="12"/>
-          </p:nvPr>
-        </p:nvSpPr>
-        <p:spPr/>
-        <p:txBody>
-          <a:bodyPr/>
-          <a:lstStyle/>
-          <a:p>
-            <a:pPr>
-              <a:defRPr/>
-            </a:pPr>
-            <a:endParaRPr lang="en-US"/>
+            <a:r>
+              <a:rPr lang="en-US" smtClean="0"/>
+              <a:t>Chef Software, Inc.</a:t>
+            </a:r>
+            <a:endParaRPr lang="en-US" dirty="0"/>
           </a:p>
         </p:txBody>
       </p:sp>
@@ -1977,12 +1730,12 @@
       </p:sp>
       <p:sp>
         <p:nvSpPr>
-          <p:cNvPr id="4" name="Slide Number Placeholder 3"/>
+          <p:cNvPr id="5" name="Header Placeholder 4"/>
           <p:cNvSpPr>
             <a:spLocks noGrp="1"/>
           </p:cNvSpPr>
           <p:nvPr>
-            <p:ph type="sldNum" sz="quarter" idx="10"/>
+            <p:ph type="hdr" sz="quarter" idx="11"/>
           </p:nvPr>
         </p:nvSpPr>
         <p:spPr/>
@@ -1993,25 +1746,22 @@
             <a:pPr>
               <a:defRPr/>
             </a:pPr>
-            <a:fld id="{DC3734AA-3150-D947-AC52-2F5DF48BFCD5}" type="slidenum">
+            <a:r>
               <a:rPr lang="en-US" smtClean="0"/>
-              <a:pPr>
-                <a:defRPr/>
-              </a:pPr>
-              <a:t>5</a:t>
-            </a:fld>
-            <a:endParaRPr lang="en-US" dirty="0"/>
-          </a:p>
-        </p:txBody>
-      </p:sp>
-      <p:sp>
-        <p:nvSpPr>
-          <p:cNvPr id="5" name="Header Placeholder 4"/>
+              <a:t>Extending Cookbooks</a:t>
+            </a:r>
+            <a:endParaRPr lang="en-US"/>
+          </a:p>
+        </p:txBody>
+      </p:sp>
+      <p:sp>
+        <p:nvSpPr>
+          <p:cNvPr id="7" name="Date Placeholder 6"/>
           <p:cNvSpPr>
             <a:spLocks noGrp="1"/>
           </p:cNvSpPr>
           <p:nvPr>
-            <p:ph type="hdr" sz="quarter" idx="11"/>
+            <p:ph type="dt" idx="13"/>
           </p:nvPr>
         </p:nvSpPr>
         <p:spPr/>
@@ -2022,29 +1772,11 @@
             <a:pPr>
               <a:defRPr/>
             </a:pPr>
-            <a:endParaRPr lang="en-US"/>
-          </a:p>
-        </p:txBody>
-      </p:sp>
-      <p:sp>
-        <p:nvSpPr>
-          <p:cNvPr id="6" name="Footer Placeholder 5"/>
-          <p:cNvSpPr>
-            <a:spLocks noGrp="1"/>
-          </p:cNvSpPr>
-          <p:nvPr>
-            <p:ph type="ftr" sz="quarter" idx="12"/>
-          </p:nvPr>
-        </p:nvSpPr>
-        <p:spPr/>
-        <p:txBody>
-          <a:bodyPr/>
-          <a:lstStyle/>
-          <a:p>
-            <a:pPr>
-              <a:defRPr/>
-            </a:pPr>
-            <a:endParaRPr lang="en-US"/>
+            <a:r>
+              <a:rPr lang="en-US" smtClean="0"/>
+              <a:t>Chef Software, Inc.</a:t>
+            </a:r>
+            <a:endParaRPr lang="en-US" dirty="0"/>
           </a:p>
         </p:txBody>
       </p:sp>
@@ -2119,12 +1851,12 @@
       </p:sp>
       <p:sp>
         <p:nvSpPr>
-          <p:cNvPr id="4" name="Slide Number Placeholder 3"/>
+          <p:cNvPr id="5" name="Header Placeholder 4"/>
           <p:cNvSpPr>
             <a:spLocks noGrp="1"/>
           </p:cNvSpPr>
           <p:nvPr>
-            <p:ph type="sldNum" sz="quarter" idx="10"/>
+            <p:ph type="hdr" sz="quarter" idx="11"/>
           </p:nvPr>
         </p:nvSpPr>
         <p:spPr/>
@@ -2135,25 +1867,22 @@
             <a:pPr>
               <a:defRPr/>
             </a:pPr>
-            <a:fld id="{DC3734AA-3150-D947-AC52-2F5DF48BFCD5}" type="slidenum">
+            <a:r>
               <a:rPr lang="en-US" smtClean="0"/>
-              <a:pPr>
-                <a:defRPr/>
-              </a:pPr>
-              <a:t>6</a:t>
-            </a:fld>
-            <a:endParaRPr lang="en-US" dirty="0"/>
-          </a:p>
-        </p:txBody>
-      </p:sp>
-      <p:sp>
-        <p:nvSpPr>
-          <p:cNvPr id="5" name="Header Placeholder 4"/>
+              <a:t>Extending Cookbooks</a:t>
+            </a:r>
+            <a:endParaRPr lang="en-US"/>
+          </a:p>
+        </p:txBody>
+      </p:sp>
+      <p:sp>
+        <p:nvSpPr>
+          <p:cNvPr id="7" name="Date Placeholder 6"/>
           <p:cNvSpPr>
             <a:spLocks noGrp="1"/>
           </p:cNvSpPr>
           <p:nvPr>
-            <p:ph type="hdr" sz="quarter" idx="11"/>
+            <p:ph type="dt" idx="13"/>
           </p:nvPr>
         </p:nvSpPr>
         <p:spPr/>
@@ -2164,29 +1893,11 @@
             <a:pPr>
               <a:defRPr/>
             </a:pPr>
-            <a:endParaRPr lang="en-US"/>
-          </a:p>
-        </p:txBody>
-      </p:sp>
-      <p:sp>
-        <p:nvSpPr>
-          <p:cNvPr id="6" name="Footer Placeholder 5"/>
-          <p:cNvSpPr>
-            <a:spLocks noGrp="1"/>
-          </p:cNvSpPr>
-          <p:nvPr>
-            <p:ph type="ftr" sz="quarter" idx="12"/>
-          </p:nvPr>
-        </p:nvSpPr>
-        <p:spPr/>
-        <p:txBody>
-          <a:bodyPr/>
-          <a:lstStyle/>
-          <a:p>
-            <a:pPr>
-              <a:defRPr/>
-            </a:pPr>
-            <a:endParaRPr lang="en-US"/>
+            <a:r>
+              <a:rPr lang="en-US" smtClean="0"/>
+              <a:t>Chef Software, Inc.</a:t>
+            </a:r>
+            <a:endParaRPr lang="en-US" dirty="0"/>
           </a:p>
         </p:txBody>
       </p:sp>
@@ -2337,12 +2048,12 @@
       </p:sp>
       <p:sp>
         <p:nvSpPr>
-          <p:cNvPr id="4" name="Slide Number Placeholder 3"/>
+          <p:cNvPr id="5" name="Header Placeholder 4"/>
           <p:cNvSpPr>
             <a:spLocks noGrp="1"/>
           </p:cNvSpPr>
           <p:nvPr>
-            <p:ph type="sldNum" sz="quarter" idx="10"/>
+            <p:ph type="hdr" sz="quarter" idx="11"/>
           </p:nvPr>
         </p:nvSpPr>
         <p:spPr/>
@@ -2353,25 +2064,22 @@
             <a:pPr>
               <a:defRPr/>
             </a:pPr>
-            <a:fld id="{DC3734AA-3150-D947-AC52-2F5DF48BFCD5}" type="slidenum">
+            <a:r>
               <a:rPr lang="en-US" smtClean="0"/>
-              <a:pPr>
-                <a:defRPr/>
-              </a:pPr>
-              <a:t>7</a:t>
-            </a:fld>
-            <a:endParaRPr lang="en-US" dirty="0"/>
-          </a:p>
-        </p:txBody>
-      </p:sp>
-      <p:sp>
-        <p:nvSpPr>
-          <p:cNvPr id="5" name="Header Placeholder 4"/>
+              <a:t>Extending Cookbooks</a:t>
+            </a:r>
+            <a:endParaRPr lang="en-US"/>
+          </a:p>
+        </p:txBody>
+      </p:sp>
+      <p:sp>
+        <p:nvSpPr>
+          <p:cNvPr id="7" name="Date Placeholder 6"/>
           <p:cNvSpPr>
             <a:spLocks noGrp="1"/>
           </p:cNvSpPr>
           <p:nvPr>
-            <p:ph type="hdr" sz="quarter" idx="11"/>
+            <p:ph type="dt" idx="13"/>
           </p:nvPr>
         </p:nvSpPr>
         <p:spPr/>
@@ -2382,29 +2090,11 @@
             <a:pPr>
               <a:defRPr/>
             </a:pPr>
-            <a:endParaRPr lang="en-US"/>
-          </a:p>
-        </p:txBody>
-      </p:sp>
-      <p:sp>
-        <p:nvSpPr>
-          <p:cNvPr id="6" name="Footer Placeholder 5"/>
-          <p:cNvSpPr>
-            <a:spLocks noGrp="1"/>
-          </p:cNvSpPr>
-          <p:nvPr>
-            <p:ph type="ftr" sz="quarter" idx="12"/>
-          </p:nvPr>
-        </p:nvSpPr>
-        <p:spPr/>
-        <p:txBody>
-          <a:bodyPr/>
-          <a:lstStyle/>
-          <a:p>
-            <a:pPr>
-              <a:defRPr/>
-            </a:pPr>
-            <a:endParaRPr lang="en-US"/>
+            <a:r>
+              <a:rPr lang="en-US" smtClean="0"/>
+              <a:t>Chef Software, Inc.</a:t>
+            </a:r>
+            <a:endParaRPr lang="en-US" dirty="0"/>
           </a:p>
         </p:txBody>
       </p:sp>
@@ -2495,12 +2185,12 @@
       </p:sp>
       <p:sp>
         <p:nvSpPr>
-          <p:cNvPr id="4" name="Slide Number Placeholder 3"/>
+          <p:cNvPr id="5" name="Header Placeholder 4"/>
           <p:cNvSpPr>
             <a:spLocks noGrp="1"/>
           </p:cNvSpPr>
           <p:nvPr>
-            <p:ph type="sldNum" sz="quarter" idx="10"/>
+            <p:ph type="hdr" sz="quarter" idx="11"/>
           </p:nvPr>
         </p:nvSpPr>
         <p:spPr/>
@@ -2511,25 +2201,22 @@
             <a:pPr>
               <a:defRPr/>
             </a:pPr>
-            <a:fld id="{DC3734AA-3150-D947-AC52-2F5DF48BFCD5}" type="slidenum">
+            <a:r>
               <a:rPr lang="en-US" smtClean="0"/>
-              <a:pPr>
-                <a:defRPr/>
-              </a:pPr>
-              <a:t>8</a:t>
-            </a:fld>
-            <a:endParaRPr lang="en-US" dirty="0"/>
-          </a:p>
-        </p:txBody>
-      </p:sp>
-      <p:sp>
-        <p:nvSpPr>
-          <p:cNvPr id="5" name="Header Placeholder 4"/>
+              <a:t>Extending Cookbooks</a:t>
+            </a:r>
+            <a:endParaRPr lang="en-US"/>
+          </a:p>
+        </p:txBody>
+      </p:sp>
+      <p:sp>
+        <p:nvSpPr>
+          <p:cNvPr id="7" name="Date Placeholder 6"/>
           <p:cNvSpPr>
             <a:spLocks noGrp="1"/>
           </p:cNvSpPr>
           <p:nvPr>
-            <p:ph type="hdr" sz="quarter" idx="11"/>
+            <p:ph type="dt" idx="13"/>
           </p:nvPr>
         </p:nvSpPr>
         <p:spPr/>
@@ -2540,29 +2227,11 @@
             <a:pPr>
               <a:defRPr/>
             </a:pPr>
-            <a:endParaRPr lang="en-US"/>
-          </a:p>
-        </p:txBody>
-      </p:sp>
-      <p:sp>
-        <p:nvSpPr>
-          <p:cNvPr id="6" name="Footer Placeholder 5"/>
-          <p:cNvSpPr>
-            <a:spLocks noGrp="1"/>
-          </p:cNvSpPr>
-          <p:nvPr>
-            <p:ph type="ftr" sz="quarter" idx="12"/>
-          </p:nvPr>
-        </p:nvSpPr>
-        <p:spPr/>
-        <p:txBody>
-          <a:bodyPr/>
-          <a:lstStyle/>
-          <a:p>
-            <a:pPr>
-              <a:defRPr/>
-            </a:pPr>
-            <a:endParaRPr lang="en-US"/>
+            <a:r>
+              <a:rPr lang="en-US" smtClean="0"/>
+              <a:t>Chef Software, Inc.</a:t>
+            </a:r>
+            <a:endParaRPr lang="en-US" dirty="0"/>
           </a:p>
         </p:txBody>
       </p:sp>
@@ -2654,12 +2323,12 @@
       </p:sp>
       <p:sp>
         <p:nvSpPr>
-          <p:cNvPr id="4" name="Slide Number Placeholder 3"/>
+          <p:cNvPr id="5" name="Header Placeholder 4"/>
           <p:cNvSpPr>
             <a:spLocks noGrp="1"/>
           </p:cNvSpPr>
           <p:nvPr>
-            <p:ph type="sldNum" sz="quarter" idx="10"/>
+            <p:ph type="hdr" sz="quarter" idx="11"/>
           </p:nvPr>
         </p:nvSpPr>
         <p:spPr/>
@@ -2670,25 +2339,22 @@
             <a:pPr>
               <a:defRPr/>
             </a:pPr>
-            <a:fld id="{DC3734AA-3150-D947-AC52-2F5DF48BFCD5}" type="slidenum">
+            <a:r>
               <a:rPr lang="en-US" smtClean="0"/>
-              <a:pPr>
-                <a:defRPr/>
-              </a:pPr>
-              <a:t>9</a:t>
-            </a:fld>
-            <a:endParaRPr lang="en-US" dirty="0"/>
-          </a:p>
-        </p:txBody>
-      </p:sp>
-      <p:sp>
-        <p:nvSpPr>
-          <p:cNvPr id="5" name="Header Placeholder 4"/>
+              <a:t>Extending Cookbooks</a:t>
+            </a:r>
+            <a:endParaRPr lang="en-US"/>
+          </a:p>
+        </p:txBody>
+      </p:sp>
+      <p:sp>
+        <p:nvSpPr>
+          <p:cNvPr id="7" name="Date Placeholder 6"/>
           <p:cNvSpPr>
             <a:spLocks noGrp="1"/>
           </p:cNvSpPr>
           <p:nvPr>
-            <p:ph type="hdr" sz="quarter" idx="11"/>
+            <p:ph type="dt" idx="13"/>
           </p:nvPr>
         </p:nvSpPr>
         <p:spPr/>
@@ -2699,29 +2365,11 @@
             <a:pPr>
               <a:defRPr/>
             </a:pPr>
-            <a:endParaRPr lang="en-US"/>
-          </a:p>
-        </p:txBody>
-      </p:sp>
-      <p:sp>
-        <p:nvSpPr>
-          <p:cNvPr id="6" name="Footer Placeholder 5"/>
-          <p:cNvSpPr>
-            <a:spLocks noGrp="1"/>
-          </p:cNvSpPr>
-          <p:nvPr>
-            <p:ph type="ftr" sz="quarter" idx="12"/>
-          </p:nvPr>
-        </p:nvSpPr>
-        <p:spPr/>
-        <p:txBody>
-          <a:bodyPr/>
-          <a:lstStyle/>
-          <a:p>
-            <a:pPr>
-              <a:defRPr/>
-            </a:pPr>
-            <a:endParaRPr lang="en-US"/>
+            <a:r>
+              <a:rPr lang="en-US" smtClean="0"/>
+              <a:t>Chef Software, Inc.</a:t>
+            </a:r>
+            <a:endParaRPr lang="en-US" dirty="0"/>
           </a:p>
         </p:txBody>
       </p:sp>
@@ -9116,7 +8764,7 @@
               <a:defRPr/>
             </a:pPr>
             <a:r>
-              <a:rPr lang="en-US" dirty="0">
+              <a:rPr lang="en-US" dirty="0" smtClean="0">
                 <a:solidFill>
                   <a:srgbClr val="7D868C"/>
                 </a:solidFill>
@@ -9127,7 +8775,7 @@
               <a:t>©</a:t>
             </a:r>
             <a:r>
-              <a:rPr lang="en-US" dirty="0" smtClean="0">
+              <a:rPr lang="is-IS" dirty="0" smtClean="0">
                 <a:solidFill>
                   <a:srgbClr val="7D868C"/>
                 </a:solidFill>
@@ -9135,7 +8783,18 @@
                 <a:ea typeface="+mn-ea"/>
                 <a:cs typeface="+mn-cs"/>
               </a:rPr>
-              <a:t>2016 </a:t>
+              <a:t>2017</a:t>
+            </a:r>
+            <a:r>
+              <a:rPr lang="en-US" dirty="0" smtClean="0">
+                <a:solidFill>
+                  <a:srgbClr val="7D868C"/>
+                </a:solidFill>
+                <a:latin typeface="+mn-lt"/>
+                <a:ea typeface="+mn-ea"/>
+                <a:cs typeface="+mn-cs"/>
+              </a:rPr>
+              <a:t> </a:t>
             </a:r>
             <a:r>
               <a:rPr lang="en-US" dirty="0">
@@ -9885,7 +9544,7 @@
               <a:defRPr/>
             </a:pPr>
             <a:r>
-              <a:rPr lang="en-US" dirty="0">
+              <a:rPr lang="en-US" dirty="0" smtClean="0">
                 <a:solidFill>
                   <a:srgbClr val="7D868C"/>
                 </a:solidFill>
@@ -9896,7 +9555,7 @@
               <a:t>©</a:t>
             </a:r>
             <a:r>
-              <a:rPr lang="en-US" dirty="0" smtClean="0">
+              <a:rPr lang="is-IS" dirty="0" smtClean="0">
                 <a:solidFill>
                   <a:srgbClr val="7D868C"/>
                 </a:solidFill>
@@ -9904,7 +9563,18 @@
                 <a:ea typeface="+mn-ea"/>
                 <a:cs typeface="+mn-cs"/>
               </a:rPr>
-              <a:t>2016 </a:t>
+              <a:t>2017</a:t>
+            </a:r>
+            <a:r>
+              <a:rPr lang="en-US" dirty="0" smtClean="0">
+                <a:solidFill>
+                  <a:srgbClr val="7D868C"/>
+                </a:solidFill>
+                <a:latin typeface="+mn-lt"/>
+                <a:ea typeface="+mn-ea"/>
+                <a:cs typeface="+mn-cs"/>
+              </a:rPr>
+              <a:t> </a:t>
             </a:r>
             <a:r>
               <a:rPr lang="en-US" dirty="0">

</xml_diff>